<commit_message>
Save kely ny finale ary oe!
</commit_message>
<xml_diff>
--- a/Presentation.pptx
+++ b/Presentation.pptx
@@ -346,7 +346,7 @@
               <a:pPr>
                 <a:defRPr/>
               </a:pPr>
-              <a:t>07/06/2017</a:t>
+              <a:t>06/07/2017</a:t>
             </a:fld>
             <a:endParaRPr lang="fr-FR"/>
           </a:p>
@@ -9073,11 +9073,7 @@
             <a:pPr marL="790575" lvl="1" indent="-257175"/>
             <a:r>
               <a:rPr lang="fr-FR" sz="2000" dirty="0" smtClean="0"/>
-              <a:t>Saisie des anomalies sur </a:t>
-            </a:r>
-            <a:r>
-              <a:rPr lang="fr-FR" sz="2000" dirty="0" err="1" smtClean="0"/>
-              <a:t>TeamForge</a:t>
+              <a:t>Saisie des anomalies sur TeamForge</a:t>
             </a:r>
             <a:endParaRPr lang="fr-FR" sz="2000" dirty="0"/>
           </a:p>
@@ -9284,11 +9280,7 @@
             <a:pPr marL="790575" lvl="1" indent="-257175"/>
             <a:r>
               <a:rPr lang="fr-FR" sz="2000" dirty="0" smtClean="0"/>
-              <a:t>Saisie des anomalies sur </a:t>
-            </a:r>
-            <a:r>
-              <a:rPr lang="fr-FR" sz="2000" dirty="0" err="1" smtClean="0"/>
-              <a:t>TeamForge</a:t>
+              <a:t>Saisie des anomalies sur TeamForge</a:t>
             </a:r>
             <a:endParaRPr lang="fr-FR" sz="2000" dirty="0"/>
           </a:p>
@@ -9473,15 +9465,7 @@
             <a:pPr marL="790575" lvl="1" indent="-257175"/>
             <a:r>
               <a:rPr lang="fr-FR" sz="2000" dirty="0" smtClean="0"/>
-              <a:t>Les anomalies sont sur </a:t>
-            </a:r>
-            <a:r>
-              <a:rPr lang="fr-FR" sz="2000" dirty="0" err="1" smtClean="0"/>
-              <a:t>TeamForge</a:t>
-            </a:r>
-            <a:r>
-              <a:rPr lang="fr-FR" sz="2000" dirty="0" smtClean="0"/>
-              <a:t> et assignées à des correcteurs</a:t>
+              <a:t>Les anomalies sont sur TeamForge et assignées à des correcteurs</a:t>
             </a:r>
           </a:p>
           <a:p>
@@ -9495,11 +9479,7 @@
             <a:pPr marL="790575" lvl="1" indent="-257175"/>
             <a:r>
               <a:rPr lang="fr-FR" sz="2000" dirty="0" smtClean="0"/>
-              <a:t>Suivre le workflow de gestion des anomalies sur </a:t>
-            </a:r>
-            <a:r>
-              <a:rPr lang="fr-FR" sz="2000" dirty="0" err="1" smtClean="0"/>
-              <a:t>TeamForge</a:t>
+              <a:t>Suivre le workflow de gestion des anomalies sur TeamForge</a:t>
             </a:r>
             <a:endParaRPr lang="fr-FR" dirty="0" smtClean="0"/>
           </a:p>
@@ -9738,15 +9718,7 @@
             <a:pPr marL="982663" lvl="1" indent="-257175"/>
             <a:r>
               <a:rPr lang="fr-FR" dirty="0" smtClean="0"/>
-              <a:t>outils : HP ALM, </a:t>
-            </a:r>
-            <a:r>
-              <a:rPr lang="fr-FR" dirty="0" err="1" smtClean="0"/>
-              <a:t>TeamForge</a:t>
-            </a:r>
-            <a:r>
-              <a:rPr lang="fr-FR" dirty="0" smtClean="0"/>
-              <a:t>, SVN, …</a:t>
+              <a:t>outils : HP ALM, TeamForge, SVN, …</a:t>
             </a:r>
           </a:p>
           <a:p>
@@ -10022,13 +9994,8 @@
           <a:p>
             <a:r>
               <a:rPr lang="fr-FR" dirty="0" smtClean="0"/>
-              <a:t>Expériences </a:t>
-            </a:r>
-            <a:r>
-              <a:rPr lang="fr-FR" dirty="0" smtClean="0"/>
-              <a:t>acquises</a:t>
-            </a:r>
-            <a:endParaRPr lang="fr-FR" dirty="0" smtClean="0"/>
+              <a:t>Expériences acquises</a:t>
+            </a:r>
           </a:p>
         </p:txBody>
       </p:sp>
@@ -10199,13 +10166,8 @@
             <a:pPr lvl="1"/>
             <a:r>
               <a:rPr lang="fr-FR" dirty="0" smtClean="0"/>
-              <a:t>Fin: 07 juillet </a:t>
-            </a:r>
-            <a:r>
-              <a:rPr lang="fr-FR" dirty="0" smtClean="0"/>
-              <a:t>2017</a:t>
-            </a:r>
-            <a:endParaRPr lang="fr-FR" dirty="0" smtClean="0"/>
+              <a:t>Fin: 07 juillet 2017</a:t>
+            </a:r>
           </a:p>
         </p:txBody>
       </p:sp>
@@ -10372,7 +10334,6 @@
               <a:rPr lang="fr-FR" dirty="0" smtClean="0"/>
               <a:t>BOENNEC</a:t>
             </a:r>
-            <a:endParaRPr lang="fr-FR" dirty="0" smtClean="0"/>
           </a:p>
           <a:p>
             <a:r>
@@ -10684,15 +10645,6 @@
               </a:rPr>
               <a:t>Développement,</a:t>
             </a:r>
-            <a:endParaRPr lang="fr-FR" sz="2000" b="1" dirty="0" smtClean="0">
-              <a:ln>
-                <a:solidFill>
-                  <a:schemeClr val="accent6">
-                    <a:lumMod val="50000"/>
-                  </a:schemeClr>
-                </a:solidFill>
-              </a:ln>
-            </a:endParaRPr>
           </a:p>
           <a:p>
             <a:pPr marL="1162050" lvl="2"/>
@@ -11442,19 +11394,7 @@
                   </a:solidFill>
                 </a:ln>
               </a:rPr>
-              <a:t>Développement de la gestion des </a:t>
-            </a:r>
-            <a:r>
-              <a:rPr lang="fr-FR" dirty="0" smtClean="0">
-                <a:ln>
-                  <a:solidFill>
-                    <a:schemeClr val="bg1">
-                      <a:lumMod val="75000"/>
-                    </a:schemeClr>
-                  </a:solidFill>
-                </a:ln>
-              </a:rPr>
-              <a:t>groupes</a:t>
+              <a:t>Développement de la gestion des groupes</a:t>
             </a:r>
             <a:endParaRPr lang="fr-FR" sz="2000" dirty="0"/>
           </a:p>

</xml_diff>